<commit_message>
Eine Fehlerbehebung bei der Anzeige von einzunehmenden Medikamenten in der MainActivity
</commit_message>
<xml_diff>
--- a/Medizinische IT-Anwendungen App Präsentation.pptx
+++ b/Medizinische IT-Anwendungen App Präsentation.pptx
@@ -118,6 +118,11 @@
       </a:defRPr>
     </a:lvl9pPr>
   </p:defaultTextStyle>
+  <p:extLst>
+    <p:ext uri="{EFAFB233-063F-42B5-8137-9DF3F51BA10A}">
+      <p15:sldGuideLst xmlns:p15="http://schemas.microsoft.com/office/powerpoint/2012/main"/>
+    </p:ext>
+  </p:extLst>
 </p:presentation>
 </file>
 
@@ -203,7 +208,7 @@
           <a:p>
             <a:fld id="{BD07E122-6A61-2A46-9D9A-4FD58304D4B1}" type="datetimeFigureOut">
               <a:rPr lang="de-DE" smtClean="0"/>
-              <a:t>04.07.20</a:t>
+              <a:t>09.07.20</a:t>
             </a:fld>
             <a:endParaRPr lang="de-DE"/>
           </a:p>
@@ -1267,10 +1272,10 @@
           <a:bodyPr/>
           <a:lstStyle/>
           <a:p>
-            <a:fld id="{601441DD-D2F2-CB4A-956F-ABFE7313EA01}" type="datetime1">
-              <a:rPr lang="de-DE" smtClean="0"/>
-              <a:t>04.07.20</a:t>
-            </a:fld>
+            <a:r>
+              <a:rPr lang="de-DE"/>
+              <a:t>14.07.20</a:t>
+            </a:r>
             <a:endParaRPr lang="en-US" dirty="0"/>
           </a:p>
         </p:txBody>
@@ -1523,10 +1528,10 @@
           <a:bodyPr/>
           <a:lstStyle/>
           <a:p>
-            <a:fld id="{43778245-A925-5145-9082-DAF95AF21867}" type="datetime1">
-              <a:rPr lang="de-DE" smtClean="0"/>
-              <a:t>04.07.20</a:t>
-            </a:fld>
+            <a:r>
+              <a:rPr lang="de-DE"/>
+              <a:t>14.07.20</a:t>
+            </a:r>
             <a:endParaRPr lang="en-US" dirty="0"/>
           </a:p>
         </p:txBody>
@@ -1842,10 +1847,10 @@
           <a:bodyPr/>
           <a:lstStyle/>
           <a:p>
-            <a:fld id="{C5113919-925A-3849-9C0F-B1C6D5713943}" type="datetime1">
-              <a:rPr lang="de-DE" smtClean="0"/>
-              <a:t>04.07.20</a:t>
-            </a:fld>
+            <a:r>
+              <a:rPr lang="de-DE"/>
+              <a:t>14.07.20</a:t>
+            </a:r>
             <a:endParaRPr lang="en-US" dirty="0"/>
           </a:p>
         </p:txBody>
@@ -2174,10 +2179,10 @@
           <a:bodyPr/>
           <a:lstStyle/>
           <a:p>
-            <a:fld id="{2EF11316-766C-094D-B2FD-04205746FD16}" type="datetime1">
-              <a:rPr lang="de-DE" smtClean="0"/>
-              <a:t>04.07.20</a:t>
-            </a:fld>
+            <a:r>
+              <a:rPr lang="de-DE"/>
+              <a:t>14.07.20</a:t>
+            </a:r>
             <a:endParaRPr lang="en-US" dirty="0"/>
           </a:p>
         </p:txBody>
@@ -2493,10 +2498,10 @@
           <a:bodyPr/>
           <a:lstStyle/>
           <a:p>
-            <a:fld id="{A5A5B78C-8B6F-184D-8806-80A06C986874}" type="datetime1">
-              <a:rPr lang="de-DE" smtClean="0"/>
-              <a:t>04.07.20</a:t>
-            </a:fld>
+            <a:r>
+              <a:rPr lang="de-DE"/>
+              <a:t>14.07.20</a:t>
+            </a:r>
             <a:endParaRPr lang="en-US" dirty="0"/>
           </a:p>
         </p:txBody>
@@ -2885,10 +2890,10 @@
           <a:bodyPr/>
           <a:lstStyle/>
           <a:p>
-            <a:fld id="{8C7713FA-4E73-4442-B8B1-723BFFAF2FD3}" type="datetime1">
-              <a:rPr lang="de-DE" smtClean="0"/>
-              <a:t>04.07.20</a:t>
-            </a:fld>
+            <a:r>
+              <a:rPr lang="de-DE"/>
+              <a:t>14.07.20</a:t>
+            </a:r>
             <a:endParaRPr lang="en-US" dirty="0"/>
           </a:p>
         </p:txBody>
@@ -3060,10 +3065,10 @@
           <a:bodyPr/>
           <a:lstStyle/>
           <a:p>
-            <a:fld id="{C2B173E2-AF23-E64B-A8A1-96187531F948}" type="datetime1">
-              <a:rPr lang="de-DE" smtClean="0"/>
-              <a:t>04.07.20</a:t>
-            </a:fld>
+            <a:r>
+              <a:rPr lang="de-DE"/>
+              <a:t>14.07.20</a:t>
+            </a:r>
             <a:endParaRPr lang="en-US" dirty="0"/>
           </a:p>
         </p:txBody>
@@ -3245,10 +3250,10 @@
           <a:bodyPr/>
           <a:lstStyle/>
           <a:p>
-            <a:fld id="{E5E5F76E-9DDE-BB43-B407-E8DDBB86F889}" type="datetime1">
-              <a:rPr lang="de-DE" smtClean="0"/>
-              <a:t>04.07.20</a:t>
-            </a:fld>
+            <a:r>
+              <a:rPr lang="de-DE"/>
+              <a:t>14.07.20</a:t>
+            </a:r>
             <a:endParaRPr lang="en-US" dirty="0"/>
           </a:p>
         </p:txBody>
@@ -3426,10 +3431,10 @@
           <a:bodyPr/>
           <a:lstStyle/>
           <a:p>
-            <a:fld id="{A220BA63-2078-364C-9A36-A19CECACE248}" type="datetime1">
-              <a:rPr lang="de-DE" smtClean="0"/>
-              <a:t>04.07.20</a:t>
-            </a:fld>
+            <a:r>
+              <a:rPr lang="de-DE"/>
+              <a:t>14.07.20</a:t>
+            </a:r>
             <a:endParaRPr lang="en-US" dirty="0"/>
           </a:p>
         </p:txBody>
@@ -3678,10 +3683,10 @@
           <a:bodyPr/>
           <a:lstStyle/>
           <a:p>
-            <a:fld id="{32A14C7F-8859-6E40-9110-10A1BF78DB08}" type="datetime1">
-              <a:rPr lang="de-DE" smtClean="0"/>
-              <a:t>04.07.20</a:t>
-            </a:fld>
+            <a:r>
+              <a:rPr lang="de-DE"/>
+              <a:t>14.07.20</a:t>
+            </a:r>
             <a:endParaRPr lang="en-US" dirty="0"/>
           </a:p>
         </p:txBody>
@@ -3980,10 +3985,10 @@
           <a:bodyPr/>
           <a:lstStyle/>
           <a:p>
-            <a:fld id="{807A7AF2-C62F-9A4A-AC51-3F76143B7FE8}" type="datetime1">
-              <a:rPr lang="de-DE" smtClean="0"/>
-              <a:t>04.07.20</a:t>
-            </a:fld>
+            <a:r>
+              <a:rPr lang="de-DE"/>
+              <a:t>14.07.20</a:t>
+            </a:r>
             <a:endParaRPr lang="en-US" dirty="0"/>
           </a:p>
         </p:txBody>
@@ -4364,10 +4369,10 @@
           <a:bodyPr/>
           <a:lstStyle/>
           <a:p>
-            <a:fld id="{CC7CF315-1DC9-614E-B5FF-EB72B4BD4FD1}" type="datetime1">
-              <a:rPr lang="de-DE" smtClean="0"/>
-              <a:t>04.07.20</a:t>
-            </a:fld>
+            <a:r>
+              <a:rPr lang="de-DE"/>
+              <a:t>14.07.20</a:t>
+            </a:r>
             <a:endParaRPr lang="en-US" dirty="0"/>
           </a:p>
         </p:txBody>
@@ -4492,10 +4497,10 @@
           <a:bodyPr/>
           <a:lstStyle/>
           <a:p>
-            <a:fld id="{399115F2-7B4E-1744-8562-F427D9A52944}" type="datetime1">
-              <a:rPr lang="de-DE" smtClean="0"/>
-              <a:t>04.07.20</a:t>
-            </a:fld>
+            <a:r>
+              <a:rPr lang="de-DE"/>
+              <a:t>14.07.20</a:t>
+            </a:r>
             <a:endParaRPr lang="en-US" dirty="0"/>
           </a:p>
         </p:txBody>
@@ -4592,10 +4597,10 @@
           <a:bodyPr/>
           <a:lstStyle/>
           <a:p>
-            <a:fld id="{97EBDDFC-DDEF-7A4D-9D8E-22069F0DC86E}" type="datetime1">
-              <a:rPr lang="de-DE" smtClean="0"/>
-              <a:t>04.07.20</a:t>
-            </a:fld>
+            <a:r>
+              <a:rPr lang="de-DE"/>
+              <a:t>14.07.20</a:t>
+            </a:r>
             <a:endParaRPr lang="en-US" dirty="0"/>
           </a:p>
         </p:txBody>
@@ -4852,10 +4857,10 @@
           <a:bodyPr/>
           <a:lstStyle/>
           <a:p>
-            <a:fld id="{E301C53D-6CCE-884B-B920-BEFFF38CD165}" type="datetime1">
-              <a:rPr lang="de-DE" smtClean="0"/>
-              <a:t>04.07.20</a:t>
-            </a:fld>
+            <a:r>
+              <a:rPr lang="de-DE"/>
+              <a:t>14.07.20</a:t>
+            </a:r>
             <a:endParaRPr lang="en-US" dirty="0"/>
           </a:p>
         </p:txBody>
@@ -5120,10 +5125,10 @@
           <a:bodyPr/>
           <a:lstStyle/>
           <a:p>
-            <a:fld id="{815F1886-CA89-C648-B743-89B37CEF5B3B}" type="datetime1">
-              <a:rPr lang="de-DE" smtClean="0"/>
-              <a:t>04.07.20</a:t>
-            </a:fld>
+            <a:r>
+              <a:rPr lang="de-DE"/>
+              <a:t>14.07.20</a:t>
+            </a:r>
             <a:endParaRPr lang="en-US" dirty="0"/>
           </a:p>
         </p:txBody>
@@ -5941,10 +5946,10 @@
             </a:lvl1pPr>
           </a:lstStyle>
           <a:p>
-            <a:fld id="{7D9EF2C0-6AB5-8E4C-9C9B-6D5F31F3F07F}" type="datetime1">
-              <a:rPr lang="de-DE" smtClean="0"/>
-              <a:t>04.07.20</a:t>
-            </a:fld>
+            <a:r>
+              <a:rPr lang="de-DE"/>
+              <a:t>14.07.20</a:t>
+            </a:r>
             <a:endParaRPr lang="en-US" dirty="0"/>
           </a:p>
         </p:txBody>
@@ -6678,10 +6683,10 @@
           <a:bodyPr/>
           <a:lstStyle/>
           <a:p>
-            <a:fld id="{8551C455-538F-A04B-88F9-7E38467ECDBE}" type="datetime1">
-              <a:rPr lang="de-DE" smtClean="0"/>
-              <a:t>04.07.20</a:t>
-            </a:fld>
+            <a:r>
+              <a:rPr lang="de-DE"/>
+              <a:t>14.07.20</a:t>
+            </a:r>
             <a:endParaRPr lang="en-US" dirty="0"/>
           </a:p>
         </p:txBody>
@@ -6849,10 +6854,10 @@
           <a:bodyPr/>
           <a:lstStyle/>
           <a:p>
-            <a:fld id="{EEE29AB8-0DB7-F545-B648-CE24B671DE1D}" type="datetime1">
-              <a:rPr lang="de-DE" smtClean="0"/>
-              <a:t>04.07.20</a:t>
-            </a:fld>
+            <a:r>
+              <a:rPr lang="de-DE"/>
+              <a:t>14.07.20</a:t>
+            </a:r>
             <a:endParaRPr lang="en-US" dirty="0"/>
           </a:p>
         </p:txBody>
@@ -7020,10 +7025,10 @@
           <a:bodyPr/>
           <a:lstStyle/>
           <a:p>
-            <a:fld id="{2E0AD69A-E2D3-7245-A0FE-49C9AF47341F}" type="datetime1">
-              <a:rPr lang="de-DE" smtClean="0"/>
-              <a:t>04.07.20</a:t>
-            </a:fld>
+            <a:r>
+              <a:rPr lang="de-DE"/>
+              <a:t>14.07.20</a:t>
+            </a:r>
             <a:endParaRPr lang="en-US" dirty="0"/>
           </a:p>
         </p:txBody>
@@ -7218,10 +7223,10 @@
           <a:bodyPr/>
           <a:lstStyle/>
           <a:p>
-            <a:fld id="{AED90B92-26ED-304B-AE1B-AD17685E0602}" type="datetime1">
-              <a:rPr lang="de-DE" smtClean="0"/>
-              <a:t>04.07.20</a:t>
-            </a:fld>
+            <a:r>
+              <a:rPr lang="de-DE"/>
+              <a:t>14.07.20</a:t>
+            </a:r>
             <a:endParaRPr lang="en-US" dirty="0"/>
           </a:p>
         </p:txBody>
@@ -7248,10 +7253,29 @@
           <a:lstStyle/>
           <a:p>
             <a:r>
-              <a:rPr lang="en-US"/>
-              <a:t>Medizinische IT-Anwendungen SoSe2020 - App Projekt - Sebastian Eggers</a:t>
-            </a:r>
-            <a:endParaRPr lang="en-US" dirty="0"/>
+              <a:rPr lang="en-US" dirty="0" err="1"/>
+              <a:t>Medizinische</a:t>
+            </a:r>
+            <a:r>
+              <a:rPr lang="en-US" dirty="0"/>
+              <a:t> IT-</a:t>
+            </a:r>
+            <a:r>
+              <a:rPr lang="en-US" dirty="0" err="1"/>
+              <a:t>Anwendungen</a:t>
+            </a:r>
+            <a:r>
+              <a:rPr lang="en-US" dirty="0"/>
+              <a:t> SoSe2020 - App </a:t>
+            </a:r>
+            <a:r>
+              <a:rPr lang="en-US" dirty="0" err="1"/>
+              <a:t>Projekt</a:t>
+            </a:r>
+            <a:r>
+              <a:rPr lang="en-US" dirty="0"/>
+              <a:t> - Sebastian Eggers</a:t>
+            </a:r>
           </a:p>
         </p:txBody>
       </p:sp>
@@ -7402,15 +7426,7 @@
           <a:p>
             <a:r>
               <a:rPr lang="de-DE" dirty="0"/>
-              <a:t>Aber in digitaler Form als App mit aktiven Erinnerungen in Form von </a:t>
-            </a:r>
-            <a:r>
-              <a:rPr lang="de-DE" dirty="0" err="1"/>
-              <a:t>Notifications</a:t>
-            </a:r>
-            <a:r>
-              <a:rPr lang="de-DE" dirty="0"/>
-              <a:t>.</a:t>
+              <a:t>Aber in digitaler Form als App mit aktiven Erinnerungen in Form von Benachrichtigungen.</a:t>
             </a:r>
           </a:p>
         </p:txBody>
@@ -7436,10 +7452,10 @@
           <a:bodyPr/>
           <a:lstStyle/>
           <a:p>
-            <a:fld id="{FD96CBB9-DB09-3944-A1CE-6AD5605EEBC7}" type="datetime1">
-              <a:rPr lang="de-DE" smtClean="0"/>
-              <a:t>04.07.20</a:t>
-            </a:fld>
+            <a:r>
+              <a:rPr lang="de-DE"/>
+              <a:t>14.07.20</a:t>
+            </a:r>
             <a:endParaRPr lang="en-US" dirty="0"/>
           </a:p>
         </p:txBody>
@@ -7622,10 +7638,10 @@
           <a:bodyPr/>
           <a:lstStyle/>
           <a:p>
-            <a:fld id="{86D15871-E1AD-A849-894D-66BD04BE81B8}" type="datetime1">
-              <a:rPr lang="de-DE" smtClean="0"/>
-              <a:t>04.07.20</a:t>
-            </a:fld>
+            <a:r>
+              <a:rPr lang="de-DE"/>
+              <a:t>14.07.20</a:t>
+            </a:r>
             <a:endParaRPr lang="en-US" dirty="0"/>
           </a:p>
         </p:txBody>
@@ -7775,12 +7791,8 @@
           </a:p>
           <a:p>
             <a:r>
-              <a:rPr lang="de-DE" dirty="0" err="1"/>
-              <a:t>Notifications</a:t>
-            </a:r>
-            <a:r>
               <a:rPr lang="de-DE" dirty="0"/>
-              <a:t> versenden</a:t>
+              <a:t>Benachrichtigungen versenden</a:t>
             </a:r>
           </a:p>
           <a:p>
@@ -7801,7 +7813,7 @@
             <a:pPr lvl="1"/>
             <a:r>
               <a:rPr lang="de-DE" dirty="0"/>
-              <a:t>Wiederholung wöchentlich oder täglich</a:t>
+              <a:t>Wiederholung täglich oder wöchentlich</a:t>
             </a:r>
           </a:p>
           <a:p>
@@ -7846,10 +7858,10 @@
           <a:bodyPr/>
           <a:lstStyle/>
           <a:p>
-            <a:fld id="{5241A18E-B9D7-6646-B559-9685608F0647}" type="datetime1">
-              <a:rPr lang="de-DE" smtClean="0"/>
-              <a:t>04.07.20</a:t>
-            </a:fld>
+            <a:r>
+              <a:rPr lang="de-DE"/>
+              <a:t>14.07.20</a:t>
+            </a:r>
             <a:endParaRPr lang="en-US" dirty="0"/>
           </a:p>
         </p:txBody>
@@ -8115,10 +8127,10 @@
           <a:bodyPr/>
           <a:lstStyle/>
           <a:p>
-            <a:fld id="{213A76D4-4704-7449-BA42-A0C0CA79F1F0}" type="datetime1">
-              <a:rPr lang="de-DE" smtClean="0"/>
-              <a:t>04.07.20</a:t>
-            </a:fld>
+            <a:r>
+              <a:rPr lang="de-DE"/>
+              <a:t>14.07.20</a:t>
+            </a:r>
             <a:endParaRPr lang="en-US" dirty="0"/>
           </a:p>
         </p:txBody>
@@ -8298,13 +8310,8 @@
             </a:r>
             <a:r>
               <a:rPr lang="de-DE" dirty="0"/>
-              <a:t> enthält sämtliche Funktionalität im Zusammenhang mit den </a:t>
-            </a:r>
-            <a:r>
-              <a:rPr lang="de-DE" dirty="0" err="1"/>
-              <a:t>Notifications</a:t>
-            </a:r>
-            <a:endParaRPr lang="de-DE" dirty="0"/>
+              <a:t> enthält sämtliche Funktionalität im Zusammenhang mit den Benachrichtigungen</a:t>
+            </a:r>
           </a:p>
           <a:p>
             <a:r>
@@ -8376,10 +8383,10 @@
           <a:bodyPr/>
           <a:lstStyle/>
           <a:p>
-            <a:fld id="{606EDD0F-A6FB-3B46-AB0A-89C0C1E9011C}" type="datetime1">
-              <a:rPr lang="de-DE" smtClean="0"/>
-              <a:t>04.07.20</a:t>
-            </a:fld>
+            <a:r>
+              <a:rPr lang="de-DE"/>
+              <a:t>14.07.20</a:t>
+            </a:r>
             <a:endParaRPr lang="en-US" dirty="0"/>
           </a:p>
         </p:txBody>
@@ -8556,10 +8563,10 @@
           <a:bodyPr/>
           <a:lstStyle/>
           <a:p>
-            <a:fld id="{EBBF863B-10A1-E14C-AA5C-611A9A53B0D3}" type="datetime1">
-              <a:rPr lang="de-DE" smtClean="0"/>
-              <a:t>04.07.20</a:t>
-            </a:fld>
+            <a:r>
+              <a:rPr lang="de-DE"/>
+              <a:t>14.07.20</a:t>
+            </a:r>
             <a:endParaRPr lang="en-US" dirty="0"/>
           </a:p>
         </p:txBody>
@@ -8736,10 +8743,10 @@
           <a:bodyPr/>
           <a:lstStyle/>
           <a:p>
-            <a:fld id="{A0AB4A7F-4437-E642-BA90-BB69C3DB6059}" type="datetime1">
-              <a:rPr lang="de-DE" smtClean="0"/>
-              <a:t>04.07.20</a:t>
-            </a:fld>
+            <a:r>
+              <a:rPr lang="de-DE"/>
+              <a:t>14.07.20</a:t>
+            </a:r>
             <a:endParaRPr lang="en-US" dirty="0"/>
           </a:p>
         </p:txBody>

</xml_diff>

<commit_message>
Kommentare in vielen Klassen
</commit_message>
<xml_diff>
--- a/Medizinische IT-Anwendungen App Präsentation.pptx
+++ b/Medizinische IT-Anwendungen App Präsentation.pptx
@@ -208,7 +208,7 @@
           <a:p>
             <a:fld id="{BD07E122-6A61-2A46-9D9A-4FD58304D4B1}" type="datetimeFigureOut">
               <a:rPr lang="de-DE" smtClean="0"/>
-              <a:t>09.07.20</a:t>
+              <a:t>10.07.20</a:t>
             </a:fld>
             <a:endParaRPr lang="de-DE"/>
           </a:p>
@@ -6627,7 +6627,7 @@
             </a:r>
             <a:r>
               <a:rPr lang="de-DE" dirty="0" err="1"/>
-              <a:t>Notifications</a:t>
+              <a:t>NotificationUtil.java</a:t>
             </a:r>
             <a:endParaRPr lang="de-DE" dirty="0"/>
           </a:p>
@@ -6657,8 +6657,8 @@
         </p:blipFill>
         <p:spPr>
           <a:xfrm>
-            <a:off x="698720" y="1363294"/>
-            <a:ext cx="6353007" cy="4142783"/>
+            <a:off x="1106960" y="1363294"/>
+            <a:ext cx="5536526" cy="4142783"/>
           </a:xfrm>
         </p:spPr>
       </p:pic>
@@ -7781,7 +7781,9 @@
         </p:nvSpPr>
         <p:spPr/>
         <p:txBody>
-          <a:bodyPr/>
+          <a:bodyPr>
+            <a:normAutofit fontScale="92500" lnSpcReduction="20000"/>
+          </a:bodyPr>
           <a:lstStyle/>
           <a:p>
             <a:r>
@@ -7790,6 +7792,27 @@
             </a:r>
           </a:p>
           <a:p>
+            <a:pPr lvl="1"/>
+            <a:r>
+              <a:rPr lang="de-DE" dirty="0"/>
+              <a:t>Hinzufügen</a:t>
+            </a:r>
+          </a:p>
+          <a:p>
+            <a:pPr lvl="1"/>
+            <a:r>
+              <a:rPr lang="de-DE" dirty="0"/>
+              <a:t>Bearbeiten</a:t>
+            </a:r>
+          </a:p>
+          <a:p>
+            <a:pPr lvl="1"/>
+            <a:r>
+              <a:rPr lang="de-DE" dirty="0"/>
+              <a:t>Löschen</a:t>
+            </a:r>
+          </a:p>
+          <a:p>
             <a:r>
               <a:rPr lang="de-DE" dirty="0"/>
               <a:t>Benachrichtigungen versenden</a:t>
@@ -7814,6 +7837,13 @@
             <a:r>
               <a:rPr lang="de-DE" dirty="0"/>
               <a:t>Wiederholung täglich oder wöchentlich</a:t>
+            </a:r>
+          </a:p>
+          <a:p>
+            <a:pPr lvl="1"/>
+            <a:r>
+              <a:rPr lang="de-DE" dirty="0"/>
+              <a:t>Ablaufdatum der Benachrichtigung auswählen</a:t>
             </a:r>
           </a:p>
           <a:p>
@@ -8006,12 +8036,14 @@
           </a:xfrm>
         </p:spPr>
         <p:txBody>
-          <a:bodyPr/>
+          <a:bodyPr>
+            <a:normAutofit lnSpcReduction="10000"/>
+          </a:bodyPr>
           <a:lstStyle/>
           <a:p>
             <a:r>
               <a:rPr lang="de-DE" dirty="0"/>
-              <a:t>6 </a:t>
+              <a:t>7 </a:t>
             </a:r>
             <a:r>
               <a:rPr lang="de-DE" dirty="0" err="1"/>
@@ -8065,6 +8097,12 @@
               <a:t>NotificationReceiver</a:t>
             </a:r>
             <a:endParaRPr lang="de-DE" dirty="0"/>
+          </a:p>
+          <a:p>
+            <a:r>
+              <a:rPr lang="de-DE" dirty="0"/>
+              <a:t>1 Worker</a:t>
+            </a:r>
           </a:p>
           <a:p>
             <a:r>
@@ -8101,8 +8139,8 @@
         </p:blipFill>
         <p:spPr>
           <a:xfrm>
-            <a:off x="4513877" y="2160588"/>
-            <a:ext cx="1798996" cy="3881437"/>
+            <a:off x="4656520" y="2160588"/>
+            <a:ext cx="1513709" cy="3881437"/>
           </a:xfrm>
         </p:spPr>
       </p:pic>
@@ -8357,8 +8395,8 @@
         </p:blipFill>
         <p:spPr>
           <a:xfrm>
-            <a:off x="4513877" y="2160588"/>
-            <a:ext cx="1798996" cy="3881437"/>
+            <a:off x="4656520" y="2160588"/>
+            <a:ext cx="1513709" cy="3881437"/>
           </a:xfrm>
         </p:spPr>
       </p:pic>
@@ -8537,8 +8575,8 @@
         </p:blipFill>
         <p:spPr>
           <a:xfrm>
-            <a:off x="710859" y="1377923"/>
-            <a:ext cx="6061900" cy="4281897"/>
+            <a:off x="714355" y="1377923"/>
+            <a:ext cx="6054908" cy="4281897"/>
           </a:xfrm>
         </p:spPr>
       </p:pic>
@@ -8717,8 +8755,8 @@
         </p:blipFill>
         <p:spPr>
           <a:xfrm>
-            <a:off x="710859" y="1797247"/>
-            <a:ext cx="6061900" cy="3443248"/>
+            <a:off x="1170381" y="1797247"/>
+            <a:ext cx="5142856" cy="3443248"/>
           </a:xfrm>
         </p:spPr>
       </p:pic>

</xml_diff>